<commit_message>
Add of workshop overview
</commit_message>
<xml_diff>
--- a/wiki/cloudbees-img/JavaPaasCloudBeesWorkshop.pptx
+++ b/wiki/cloudbees-img/JavaPaasCloudBeesWorkshop.pptx
@@ -7392,61 +7392,6 @@
       </p:sp>
       <p:sp>
         <p:nvSpPr>
-          <p:cNvPr id="11" name="Rectangle 10"/>
-          <p:cNvSpPr/>
-          <p:nvPr/>
-        </p:nvSpPr>
-        <p:spPr>
-          <a:xfrm>
-            <a:off x="4947689" y="988216"/>
-            <a:ext cx="1357203" cy="896552"/>
-          </a:xfrm>
-          <a:prstGeom prst="rect">
-            <a:avLst/>
-          </a:prstGeom>
-          <a:solidFill>
-            <a:schemeClr val="accent1">
-              <a:lumMod val="75000"/>
-            </a:schemeClr>
-          </a:solidFill>
-          <a:ln>
-            <a:solidFill>
-              <a:schemeClr val="accent1">
-                <a:lumMod val="40000"/>
-                <a:lumOff val="60000"/>
-              </a:schemeClr>
-            </a:solidFill>
-          </a:ln>
-        </p:spPr>
-        <p:style>
-          <a:lnRef idx="3">
-            <a:schemeClr val="lt1"/>
-          </a:lnRef>
-          <a:fillRef idx="1">
-            <a:schemeClr val="accent4"/>
-          </a:fillRef>
-          <a:effectRef idx="1">
-            <a:schemeClr val="accent4"/>
-          </a:effectRef>
-          <a:fontRef idx="minor">
-            <a:schemeClr val="lt1"/>
-          </a:fontRef>
-        </p:style>
-        <p:txBody>
-          <a:bodyPr rtlCol="0" anchor="ctr"/>
-          <a:lstStyle/>
-          <a:p>
-            <a:pPr algn="ctr"/>
-            <a:r>
-              <a:rPr lang="en-US" dirty="0" smtClean="0"/>
-              <a:t>Deploy Integration</a:t>
-            </a:r>
-            <a:endParaRPr lang="en-US" dirty="0"/>
-          </a:p>
-        </p:txBody>
-      </p:sp>
-      <p:sp>
-        <p:nvSpPr>
           <p:cNvPr id="12" name="Rectangle 11"/>
           <p:cNvSpPr/>
           <p:nvPr/>
@@ -7611,68 +7556,13 @@
       </p:sp>
       <p:sp>
         <p:nvSpPr>
-          <p:cNvPr id="21" name="Rectangle 20"/>
-          <p:cNvSpPr/>
-          <p:nvPr/>
-        </p:nvSpPr>
-        <p:spPr>
-          <a:xfrm>
-            <a:off x="2493278" y="3892524"/>
-            <a:ext cx="1357203" cy="896552"/>
-          </a:xfrm>
-          <a:prstGeom prst="rect">
-            <a:avLst/>
-          </a:prstGeom>
-          <a:solidFill>
-            <a:schemeClr val="accent1">
-              <a:lumMod val="75000"/>
-            </a:schemeClr>
-          </a:solidFill>
-          <a:ln>
-            <a:solidFill>
-              <a:schemeClr val="accent1">
-                <a:lumMod val="40000"/>
-                <a:lumOff val="60000"/>
-              </a:schemeClr>
-            </a:solidFill>
-          </a:ln>
-        </p:spPr>
-        <p:style>
-          <a:lnRef idx="3">
-            <a:schemeClr val="lt1"/>
-          </a:lnRef>
-          <a:fillRef idx="1">
-            <a:schemeClr val="accent4"/>
-          </a:fillRef>
-          <a:effectRef idx="1">
-            <a:schemeClr val="accent4"/>
-          </a:effectRef>
-          <a:fontRef idx="minor">
-            <a:schemeClr val="lt1"/>
-          </a:fontRef>
-        </p:style>
-        <p:txBody>
-          <a:bodyPr rtlCol="0" anchor="ctr"/>
-          <a:lstStyle/>
-          <a:p>
-            <a:pPr algn="ctr"/>
-            <a:r>
-              <a:rPr lang="en-US" dirty="0" smtClean="0"/>
-              <a:t>Deploy Production</a:t>
-            </a:r>
-            <a:endParaRPr lang="en-US" dirty="0"/>
-          </a:p>
-        </p:txBody>
-      </p:sp>
-      <p:sp>
-        <p:nvSpPr>
           <p:cNvPr id="22" name="Cloud 21"/>
           <p:cNvSpPr/>
           <p:nvPr/>
         </p:nvSpPr>
         <p:spPr>
           <a:xfrm>
-            <a:off x="2661322" y="5129743"/>
+            <a:off x="2354652" y="5129743"/>
             <a:ext cx="1640603" cy="1045974"/>
           </a:xfrm>
           <a:prstGeom prst="cloud">
@@ -7727,7 +7617,7 @@
         </p:nvSpPr>
         <p:spPr>
           <a:xfrm>
-            <a:off x="1638800" y="5178064"/>
+            <a:off x="1346700" y="5178064"/>
             <a:ext cx="855910" cy="949333"/>
           </a:xfrm>
           <a:prstGeom prst="can">
@@ -8399,7 +8289,7 @@
         </p:nvSpPr>
         <p:spPr>
           <a:xfrm>
-            <a:off x="4470501" y="5154924"/>
+            <a:off x="4117732" y="5154924"/>
             <a:ext cx="278631" cy="974237"/>
           </a:xfrm>
           <a:prstGeom prst="leftBrace">
@@ -8445,7 +8335,7 @@
         </p:nvSpPr>
         <p:spPr>
           <a:xfrm>
-            <a:off x="5103263" y="2214747"/>
+            <a:off x="4749132" y="2214747"/>
             <a:ext cx="1640603" cy="1045974"/>
           </a:xfrm>
           <a:prstGeom prst="cloud">
@@ -8500,7 +8390,7 @@
         </p:nvSpPr>
         <p:spPr>
           <a:xfrm>
-            <a:off x="4080741" y="2263068"/>
+            <a:off x="3726610" y="2263068"/>
             <a:ext cx="855910" cy="949333"/>
           </a:xfrm>
           <a:prstGeom prst="can">
@@ -8555,7 +8445,7 @@
         </p:nvSpPr>
         <p:spPr>
           <a:xfrm>
-            <a:off x="6912442" y="2263618"/>
+            <a:off x="6516563" y="2253517"/>
             <a:ext cx="278631" cy="974237"/>
           </a:xfrm>
           <a:prstGeom prst="leftBrace">
@@ -8601,7 +8491,7 @@
         </p:nvSpPr>
         <p:spPr>
           <a:xfrm>
-            <a:off x="7190909" y="2289071"/>
+            <a:off x="6795030" y="2278970"/>
             <a:ext cx="1953092" cy="369332"/>
           </a:xfrm>
           <a:prstGeom prst="rect">
@@ -8632,7 +8522,7 @@
         </p:nvSpPr>
         <p:spPr>
           <a:xfrm>
-            <a:off x="4749132" y="5190065"/>
+            <a:off x="4396363" y="5190065"/>
             <a:ext cx="1953092" cy="923330"/>
           </a:xfrm>
           <a:prstGeom prst="rect">
@@ -8674,6 +8564,116 @@
             <a:endParaRPr lang="en-US" b="1" dirty="0">
               <a:latin typeface="+mn-lt"/>
             </a:endParaRPr>
+          </a:p>
+        </p:txBody>
+      </p:sp>
+      <p:sp>
+        <p:nvSpPr>
+          <p:cNvPr id="49" name="Down Arrow Callout 48"/>
+          <p:cNvSpPr/>
+          <p:nvPr/>
+        </p:nvSpPr>
+        <p:spPr>
+          <a:xfrm>
+            <a:off x="4947689" y="988216"/>
+            <a:ext cx="1357203" cy="1399384"/>
+          </a:xfrm>
+          <a:prstGeom prst="downArrowCallout">
+            <a:avLst/>
+          </a:prstGeom>
+          <a:solidFill>
+            <a:srgbClr val="376092"/>
+          </a:solidFill>
+          <a:ln>
+            <a:solidFill>
+              <a:schemeClr val="tx2">
+                <a:lumMod val="20000"/>
+                <a:lumOff val="80000"/>
+              </a:schemeClr>
+            </a:solidFill>
+          </a:ln>
+        </p:spPr>
+        <p:style>
+          <a:lnRef idx="3">
+            <a:schemeClr val="lt1"/>
+          </a:lnRef>
+          <a:fillRef idx="1">
+            <a:schemeClr val="accent1"/>
+          </a:fillRef>
+          <a:effectRef idx="1">
+            <a:schemeClr val="accent1"/>
+          </a:effectRef>
+          <a:fontRef idx="minor">
+            <a:schemeClr val="lt1"/>
+          </a:fontRef>
+        </p:style>
+        <p:txBody>
+          <a:bodyPr rtlCol="0" anchor="ctr"/>
+          <a:lstStyle/>
+          <a:p>
+            <a:pPr algn="ctr"/>
+            <a:r>
+              <a:rPr lang="en-US" dirty="0"/>
+              <a:t>Deploy Integration</a:t>
+            </a:r>
+            <a:endParaRPr lang="en-US" dirty="0"/>
+          </a:p>
+        </p:txBody>
+      </p:sp>
+      <p:sp>
+        <p:nvSpPr>
+          <p:cNvPr id="50" name="Down Arrow Callout 49"/>
+          <p:cNvSpPr/>
+          <p:nvPr/>
+        </p:nvSpPr>
+        <p:spPr>
+          <a:xfrm>
+            <a:off x="2494710" y="3884026"/>
+            <a:ext cx="1357203" cy="1399384"/>
+          </a:xfrm>
+          <a:prstGeom prst="downArrowCallout">
+            <a:avLst/>
+          </a:prstGeom>
+          <a:solidFill>
+            <a:srgbClr val="376092"/>
+          </a:solidFill>
+          <a:ln>
+            <a:solidFill>
+              <a:schemeClr val="tx2">
+                <a:lumMod val="20000"/>
+                <a:lumOff val="80000"/>
+              </a:schemeClr>
+            </a:solidFill>
+          </a:ln>
+        </p:spPr>
+        <p:style>
+          <a:lnRef idx="3">
+            <a:schemeClr val="lt1"/>
+          </a:lnRef>
+          <a:fillRef idx="1">
+            <a:schemeClr val="accent1"/>
+          </a:fillRef>
+          <a:effectRef idx="1">
+            <a:schemeClr val="accent1"/>
+          </a:effectRef>
+          <a:fontRef idx="minor">
+            <a:schemeClr val="lt1"/>
+          </a:fontRef>
+        </p:style>
+        <p:txBody>
+          <a:bodyPr rtlCol="0" anchor="ctr"/>
+          <a:lstStyle/>
+          <a:p>
+            <a:pPr algn="ctr"/>
+            <a:r>
+              <a:rPr lang="en-US" dirty="0"/>
+              <a:t>Deploy </a:t>
+            </a:r>
+            <a:r>
+              <a:rPr lang="en-US" dirty="0" smtClean="0"/>
+              <a:t>Production</a:t>
+            </a:r>
+            <a:endParaRPr lang="en-US" dirty="0"/>
           </a:p>
         </p:txBody>
       </p:sp>

</xml_diff>

<commit_message>
Add of topics on workshop overview
</commit_message>
<xml_diff>
--- a/wiki/cloudbees-img/JavaPaasCloudBeesWorkshop.pptx
+++ b/wiki/cloudbees-img/JavaPaasCloudBeesWorkshop.pptx
@@ -8677,6 +8677,186 @@
           </a:p>
         </p:txBody>
       </p:sp>
+      <p:sp>
+        <p:nvSpPr>
+          <p:cNvPr id="51" name="TextBox 50"/>
+          <p:cNvSpPr txBox="1"/>
+          <p:nvPr/>
+        </p:nvSpPr>
+        <p:spPr>
+          <a:xfrm>
+            <a:off x="2484251" y="711131"/>
+            <a:ext cx="787395" cy="369332"/>
+          </a:xfrm>
+          <a:prstGeom prst="rect">
+            <a:avLst/>
+          </a:prstGeom>
+          <a:noFill/>
+        </p:spPr>
+        <p:txBody>
+          <a:bodyPr wrap="none" rtlCol="0">
+            <a:spAutoFit/>
+          </a:bodyPr>
+          <a:lstStyle/>
+          <a:p>
+            <a:r>
+              <a:rPr lang="en-US" b="1" dirty="0" smtClean="0">
+                <a:latin typeface="Calibri"/>
+                <a:cs typeface="Calibri"/>
+              </a:rPr>
+              <a:t>@DEV</a:t>
+            </a:r>
+            <a:endParaRPr lang="en-US" b="1" dirty="0">
+              <a:latin typeface="Calibri"/>
+              <a:cs typeface="Calibri"/>
+            </a:endParaRPr>
+          </a:p>
+        </p:txBody>
+      </p:sp>
+      <p:sp>
+        <p:nvSpPr>
+          <p:cNvPr id="52" name="TextBox 51"/>
+          <p:cNvSpPr txBox="1"/>
+          <p:nvPr/>
+        </p:nvSpPr>
+        <p:spPr>
+          <a:xfrm>
+            <a:off x="4947689" y="711131"/>
+            <a:ext cx="979755" cy="369332"/>
+          </a:xfrm>
+          <a:prstGeom prst="rect">
+            <a:avLst/>
+          </a:prstGeom>
+          <a:noFill/>
+        </p:spPr>
+        <p:txBody>
+          <a:bodyPr wrap="none" rtlCol="0">
+            <a:spAutoFit/>
+          </a:bodyPr>
+          <a:lstStyle/>
+          <a:p>
+            <a:r>
+              <a:rPr lang="en-US" b="1" dirty="0" smtClean="0">
+                <a:latin typeface="Calibri"/>
+                <a:cs typeface="Calibri"/>
+              </a:rPr>
+              <a:t>@INTEG</a:t>
+            </a:r>
+            <a:endParaRPr lang="en-US" b="1" dirty="0">
+              <a:latin typeface="Calibri"/>
+              <a:cs typeface="Calibri"/>
+            </a:endParaRPr>
+          </a:p>
+        </p:txBody>
+      </p:sp>
+      <p:sp>
+        <p:nvSpPr>
+          <p:cNvPr id="53" name="TextBox 52"/>
+          <p:cNvSpPr txBox="1"/>
+          <p:nvPr/>
+        </p:nvSpPr>
+        <p:spPr>
+          <a:xfrm>
+            <a:off x="7402100" y="711131"/>
+            <a:ext cx="842335" cy="369332"/>
+          </a:xfrm>
+          <a:prstGeom prst="rect">
+            <a:avLst/>
+          </a:prstGeom>
+          <a:noFill/>
+        </p:spPr>
+        <p:txBody>
+          <a:bodyPr wrap="none" rtlCol="0">
+            <a:spAutoFit/>
+          </a:bodyPr>
+          <a:lstStyle/>
+          <a:p>
+            <a:r>
+              <a:rPr lang="en-US" b="1" dirty="0" smtClean="0">
+                <a:latin typeface="Calibri"/>
+                <a:cs typeface="Calibri"/>
+              </a:rPr>
+              <a:t>@TEST</a:t>
+            </a:r>
+            <a:endParaRPr lang="en-US" b="1" dirty="0">
+              <a:latin typeface="Calibri"/>
+              <a:cs typeface="Calibri"/>
+            </a:endParaRPr>
+          </a:p>
+        </p:txBody>
+      </p:sp>
+      <p:sp>
+        <p:nvSpPr>
+          <p:cNvPr id="54" name="TextBox 53"/>
+          <p:cNvSpPr txBox="1"/>
+          <p:nvPr/>
+        </p:nvSpPr>
+        <p:spPr>
+          <a:xfrm>
+            <a:off x="2493278" y="3603255"/>
+            <a:ext cx="824753" cy="369332"/>
+          </a:xfrm>
+          <a:prstGeom prst="rect">
+            <a:avLst/>
+          </a:prstGeom>
+          <a:noFill/>
+        </p:spPr>
+        <p:txBody>
+          <a:bodyPr wrap="none" rtlCol="0">
+            <a:spAutoFit/>
+          </a:bodyPr>
+          <a:lstStyle/>
+          <a:p>
+            <a:r>
+              <a:rPr lang="en-US" b="1" dirty="0" smtClean="0">
+                <a:latin typeface="Calibri"/>
+                <a:cs typeface="Calibri"/>
+              </a:rPr>
+              <a:t>@RUN</a:t>
+            </a:r>
+            <a:endParaRPr lang="en-US" b="1" dirty="0">
+              <a:latin typeface="Calibri"/>
+              <a:cs typeface="Calibri"/>
+            </a:endParaRPr>
+          </a:p>
+        </p:txBody>
+      </p:sp>
+      <p:sp>
+        <p:nvSpPr>
+          <p:cNvPr id="55" name="TextBox 54"/>
+          <p:cNvSpPr txBox="1"/>
+          <p:nvPr/>
+        </p:nvSpPr>
+        <p:spPr>
+          <a:xfrm>
+            <a:off x="4947689" y="3603255"/>
+            <a:ext cx="863412" cy="369332"/>
+          </a:xfrm>
+          <a:prstGeom prst="rect">
+            <a:avLst/>
+          </a:prstGeom>
+          <a:noFill/>
+        </p:spPr>
+        <p:txBody>
+          <a:bodyPr wrap="none" rtlCol="0">
+            <a:spAutoFit/>
+          </a:bodyPr>
+          <a:lstStyle/>
+          <a:p>
+            <a:r>
+              <a:rPr lang="en-US" b="1" dirty="0" smtClean="0">
+                <a:latin typeface="Calibri"/>
+                <a:cs typeface="Calibri"/>
+              </a:rPr>
+              <a:t>@PERF</a:t>
+            </a:r>
+            <a:endParaRPr lang="en-US" b="1" dirty="0">
+              <a:latin typeface="Calibri"/>
+              <a:cs typeface="Calibri"/>
+            </a:endParaRPr>
+          </a:p>
+        </p:txBody>
+      </p:sp>
     </p:spTree>
     <p:extLst>
       <p:ext uri="{BB962C8B-B14F-4D97-AF65-F5344CB8AC3E}">

</xml_diff>

<commit_message>
Update workshop overview + remove @ADMIN part
</commit_message>
<xml_diff>
--- a/wiki/cloudbees-img/JavaPaasCloudBeesWorkshop.pptx
+++ b/wiki/cloudbees-img/JavaPaasCloudBeesWorkshop.pptx
@@ -7213,7 +7213,7 @@
             <p:ph idx="4294967295"/>
             <p:extLst>
               <p:ext uri="{D42A27DB-BD31-4B8C-83A1-F6EECF244321}">
-                <p14:modId xmlns:p14="http://schemas.microsoft.com/office/powerpoint/2010/main" val="1781419472"/>
+                <p14:modId xmlns:p14="http://schemas.microsoft.com/office/powerpoint/2010/main" val="1055551614"/>
               </p:ext>
             </p:extLst>
           </p:nvPr>
@@ -7336,7 +7336,7 @@
         </p:nvSpPr>
         <p:spPr>
           <a:xfrm>
-            <a:off x="2493278" y="988212"/>
+            <a:off x="2489481" y="988212"/>
             <a:ext cx="1357203" cy="896552"/>
           </a:xfrm>
           <a:prstGeom prst="rect">
@@ -7602,8 +7602,8 @@
           <a:p>
             <a:pPr algn="ctr"/>
             <a:r>
-              <a:rPr lang="en-US" dirty="0" smtClean="0"/>
-              <a:t>pet-clinic</a:t>
+              <a:rPr lang="en-US" dirty="0" err="1" smtClean="0"/>
+              <a:t>petclinic</a:t>
             </a:r>
             <a:endParaRPr lang="en-US" dirty="0"/>
           </a:p>
@@ -7850,57 +7850,6 @@
       </p:sp>
       <p:sp>
         <p:nvSpPr>
-          <p:cNvPr id="28" name="Striped Right Arrow 27"/>
-          <p:cNvSpPr/>
-          <p:nvPr/>
-        </p:nvSpPr>
-        <p:spPr>
-          <a:xfrm>
-            <a:off x="4036503" y="4119906"/>
-            <a:ext cx="725164" cy="435824"/>
-          </a:xfrm>
-          <a:prstGeom prst="stripedRightArrow">
-            <a:avLst/>
-          </a:prstGeom>
-          <a:solidFill>
-            <a:schemeClr val="accent6">
-              <a:lumMod val="75000"/>
-            </a:schemeClr>
-          </a:solidFill>
-          <a:ln w="28575" cmpd="sng">
-            <a:solidFill>
-              <a:schemeClr val="accent6">
-                <a:lumMod val="20000"/>
-                <a:lumOff val="80000"/>
-              </a:schemeClr>
-            </a:solidFill>
-          </a:ln>
-        </p:spPr>
-        <p:style>
-          <a:lnRef idx="1">
-            <a:schemeClr val="accent4"/>
-          </a:lnRef>
-          <a:fillRef idx="2">
-            <a:schemeClr val="accent4"/>
-          </a:fillRef>
-          <a:effectRef idx="1">
-            <a:schemeClr val="accent4"/>
-          </a:effectRef>
-          <a:fontRef idx="minor">
-            <a:schemeClr val="dk1"/>
-          </a:fontRef>
-        </p:style>
-        <p:txBody>
-          <a:bodyPr rtlCol="0" anchor="ctr"/>
-          <a:lstStyle/>
-          <a:p>
-            <a:pPr algn="ctr"/>
-            <a:endParaRPr lang="en-US"/>
-          </a:p>
-        </p:txBody>
-      </p:sp>
-      <p:sp>
-        <p:nvSpPr>
           <p:cNvPr id="30" name="Down Arrow 29"/>
           <p:cNvSpPr/>
           <p:nvPr/>
@@ -7967,7 +7916,7 @@
           <a:noFill/>
           <a:ln w="38100" cmpd="sng">
             <a:solidFill>
-              <a:schemeClr val="accent2">
+              <a:schemeClr val="tx2">
                 <a:lumMod val="75000"/>
               </a:schemeClr>
             </a:solidFill>
@@ -8060,7 +8009,7 @@
         </p:nvSpPr>
         <p:spPr>
           <a:xfrm>
-            <a:off x="712073" y="390470"/>
+            <a:off x="286385" y="4979105"/>
             <a:ext cx="468473" cy="369332"/>
           </a:xfrm>
           <a:prstGeom prst="rect">
@@ -8078,7 +8027,7 @@
             <a:r>
               <a:rPr lang="en-US" b="1" dirty="0" err="1" smtClean="0">
                 <a:solidFill>
-                  <a:schemeClr val="accent2">
+                  <a:schemeClr val="tx2">
                     <a:lumMod val="75000"/>
                   </a:schemeClr>
                 </a:solidFill>
@@ -8088,7 +8037,7 @@
             </a:r>
             <a:endParaRPr lang="en-US" b="1" dirty="0">
               <a:solidFill>
-                <a:schemeClr val="accent2">
+                <a:schemeClr val="tx2">
                   <a:lumMod val="75000"/>
                 </a:schemeClr>
               </a:solidFill>
@@ -8199,52 +8148,7 @@
         </p:nvSpPr>
         <p:spPr>
           <a:xfrm>
-            <a:off x="5199677" y="390470"/>
-            <a:ext cx="884602" cy="369332"/>
-          </a:xfrm>
-          <a:prstGeom prst="rect">
-            <a:avLst/>
-          </a:prstGeom>
-          <a:noFill/>
-        </p:spPr>
-        <p:txBody>
-          <a:bodyPr wrap="none" rtlCol="0">
-            <a:spAutoFit/>
-          </a:bodyPr>
-          <a:lstStyle/>
-          <a:p>
-            <a:pPr algn="ctr"/>
-            <a:r>
-              <a:rPr lang="en-US" b="1" dirty="0" smtClean="0">
-                <a:solidFill>
-                  <a:schemeClr val="accent2">
-                    <a:lumMod val="75000"/>
-                  </a:schemeClr>
-                </a:solidFill>
-                <a:latin typeface="+mn-lt"/>
-              </a:rPr>
-              <a:t>Jenkins</a:t>
-            </a:r>
-            <a:endParaRPr lang="en-US" b="1" dirty="0">
-              <a:solidFill>
-                <a:schemeClr val="accent2">
-                  <a:lumMod val="75000"/>
-                </a:schemeClr>
-              </a:solidFill>
-              <a:latin typeface="+mn-lt"/>
-            </a:endParaRPr>
-          </a:p>
-        </p:txBody>
-      </p:sp>
-      <p:sp>
-        <p:nvSpPr>
-          <p:cNvPr id="39" name="TextBox 38"/>
-          <p:cNvSpPr txBox="1"/>
-          <p:nvPr/>
-        </p:nvSpPr>
-        <p:spPr>
-          <a:xfrm>
-            <a:off x="3995255" y="3327198"/>
+            <a:off x="2368750" y="2082231"/>
             <a:ext cx="884602" cy="369332"/>
           </a:xfrm>
           <a:prstGeom prst="rect">
@@ -8375,8 +8279,8 @@
           <a:p>
             <a:pPr algn="ctr"/>
             <a:r>
-              <a:rPr lang="en-US" dirty="0" smtClean="0"/>
-              <a:t>pet-clinic</a:t>
+              <a:rPr lang="en-US" dirty="0" err="1" smtClean="0"/>
+              <a:t>petclinic</a:t>
             </a:r>
             <a:endParaRPr lang="en-US" dirty="0"/>
           </a:p>
@@ -8628,7 +8532,7 @@
         </p:nvSpPr>
         <p:spPr>
           <a:xfrm>
-            <a:off x="2494710" y="3889542"/>
+            <a:off x="2489481" y="3889542"/>
             <a:ext cx="1357203" cy="1399384"/>
           </a:xfrm>
           <a:prstGeom prst="downArrowCallout">
@@ -8685,7 +8589,7 @@
         </p:nvSpPr>
         <p:spPr>
           <a:xfrm>
-            <a:off x="2484251" y="711131"/>
+            <a:off x="2774385" y="390470"/>
             <a:ext cx="787395" cy="369332"/>
           </a:xfrm>
           <a:prstGeom prst="rect">
@@ -8721,7 +8625,7 @@
         </p:nvSpPr>
         <p:spPr>
           <a:xfrm>
-            <a:off x="4947689" y="711131"/>
+            <a:off x="5078241" y="390470"/>
             <a:ext cx="979755" cy="369332"/>
           </a:xfrm>
           <a:prstGeom prst="rect">
@@ -8757,7 +8661,7 @@
         </p:nvSpPr>
         <p:spPr>
           <a:xfrm>
-            <a:off x="7402100" y="711131"/>
+            <a:off x="7659534" y="390470"/>
             <a:ext cx="842335" cy="369332"/>
           </a:xfrm>
           <a:prstGeom prst="rect">
@@ -8793,7 +8697,7 @@
         </p:nvSpPr>
         <p:spPr>
           <a:xfrm>
-            <a:off x="2493278" y="3603255"/>
+            <a:off x="2774385" y="3275657"/>
             <a:ext cx="824753" cy="369332"/>
           </a:xfrm>
           <a:prstGeom prst="rect">
@@ -8829,7 +8733,7 @@
         </p:nvSpPr>
         <p:spPr>
           <a:xfrm>
-            <a:off x="4947689" y="3603255"/>
+            <a:off x="5194584" y="3275657"/>
             <a:ext cx="863412" cy="369332"/>
           </a:xfrm>
           <a:prstGeom prst="rect">
@@ -8853,6 +8757,200 @@
             <a:endParaRPr lang="en-US" b="1" dirty="0">
               <a:latin typeface="Calibri"/>
               <a:cs typeface="Calibri"/>
+            </a:endParaRPr>
+          </a:p>
+        </p:txBody>
+      </p:sp>
+      <p:sp>
+        <p:nvSpPr>
+          <p:cNvPr id="57" name="Rectangle 56"/>
+          <p:cNvSpPr/>
+          <p:nvPr/>
+        </p:nvSpPr>
+        <p:spPr>
+          <a:xfrm>
+            <a:off x="7379974" y="3889541"/>
+            <a:ext cx="1357203" cy="896552"/>
+          </a:xfrm>
+          <a:prstGeom prst="rect">
+            <a:avLst/>
+          </a:prstGeom>
+          <a:solidFill>
+            <a:schemeClr val="accent1">
+              <a:lumMod val="75000"/>
+            </a:schemeClr>
+          </a:solidFill>
+          <a:ln>
+            <a:solidFill>
+              <a:schemeClr val="accent1">
+                <a:lumMod val="40000"/>
+                <a:lumOff val="60000"/>
+              </a:schemeClr>
+            </a:solidFill>
+          </a:ln>
+        </p:spPr>
+        <p:style>
+          <a:lnRef idx="3">
+            <a:schemeClr val="lt1"/>
+          </a:lnRef>
+          <a:fillRef idx="1">
+            <a:schemeClr val="accent4"/>
+          </a:fillRef>
+          <a:effectRef idx="1">
+            <a:schemeClr val="accent4"/>
+          </a:effectRef>
+          <a:fontRef idx="minor">
+            <a:schemeClr val="lt1"/>
+          </a:fontRef>
+        </p:style>
+        <p:txBody>
+          <a:bodyPr rtlCol="0" anchor="ctr"/>
+          <a:lstStyle/>
+          <a:p>
+            <a:pPr algn="ctr"/>
+            <a:r>
+              <a:rPr lang="en-US" dirty="0" smtClean="0"/>
+              <a:t>Command Line Tools</a:t>
+            </a:r>
+            <a:endParaRPr lang="en-US" dirty="0"/>
+          </a:p>
+        </p:txBody>
+      </p:sp>
+      <p:sp>
+        <p:nvSpPr>
+          <p:cNvPr id="58" name="Rounded Rectangle 57"/>
+          <p:cNvSpPr/>
+          <p:nvPr/>
+        </p:nvSpPr>
+        <p:spPr>
+          <a:xfrm>
+            <a:off x="7216078" y="3696529"/>
+            <a:ext cx="1694670" cy="1282576"/>
+          </a:xfrm>
+          <a:prstGeom prst="roundRect">
+            <a:avLst/>
+          </a:prstGeom>
+          <a:noFill/>
+          <a:ln w="38100" cmpd="sng">
+            <a:solidFill>
+              <a:schemeClr val="bg2">
+                <a:lumMod val="25000"/>
+              </a:schemeClr>
+            </a:solidFill>
+            <a:prstDash val="dash"/>
+          </a:ln>
+        </p:spPr>
+        <p:style>
+          <a:lnRef idx="1">
+            <a:schemeClr val="accent1"/>
+          </a:lnRef>
+          <a:fillRef idx="3">
+            <a:schemeClr val="accent1"/>
+          </a:fillRef>
+          <a:effectRef idx="2">
+            <a:schemeClr val="accent1"/>
+          </a:effectRef>
+          <a:fontRef idx="minor">
+            <a:schemeClr val="lt1"/>
+          </a:fontRef>
+        </p:style>
+        <p:txBody>
+          <a:bodyPr rtlCol="0" anchor="ctr"/>
+          <a:lstStyle/>
+          <a:p>
+            <a:pPr algn="ctr"/>
+            <a:endParaRPr lang="en-US"/>
+          </a:p>
+        </p:txBody>
+      </p:sp>
+      <p:sp>
+        <p:nvSpPr>
+          <p:cNvPr id="61" name="TextBox 60"/>
+          <p:cNvSpPr txBox="1"/>
+          <p:nvPr/>
+        </p:nvSpPr>
+        <p:spPr>
+          <a:xfrm>
+            <a:off x="7626869" y="3275657"/>
+            <a:ext cx="772905" cy="369332"/>
+          </a:xfrm>
+          <a:prstGeom prst="rect">
+            <a:avLst/>
+          </a:prstGeom>
+          <a:noFill/>
+        </p:spPr>
+        <p:txBody>
+          <a:bodyPr wrap="none" rtlCol="0">
+            <a:spAutoFit/>
+          </a:bodyPr>
+          <a:lstStyle/>
+          <a:p>
+            <a:r>
+              <a:rPr lang="en-US" b="1" dirty="0" smtClean="0">
+                <a:latin typeface="Calibri"/>
+                <a:cs typeface="Calibri"/>
+              </a:rPr>
+              <a:t>@SDK</a:t>
+            </a:r>
+            <a:endParaRPr lang="en-US" b="1" dirty="0">
+              <a:latin typeface="Calibri"/>
+              <a:cs typeface="Calibri"/>
+            </a:endParaRPr>
+          </a:p>
+        </p:txBody>
+      </p:sp>
+      <p:sp>
+        <p:nvSpPr>
+          <p:cNvPr id="62" name="TextBox 61"/>
+          <p:cNvSpPr txBox="1"/>
+          <p:nvPr/>
+        </p:nvSpPr>
+        <p:spPr>
+          <a:xfrm>
+            <a:off x="7216078" y="4989819"/>
+            <a:ext cx="1622297" cy="369332"/>
+          </a:xfrm>
+          <a:prstGeom prst="rect">
+            <a:avLst/>
+          </a:prstGeom>
+          <a:noFill/>
+        </p:spPr>
+        <p:txBody>
+          <a:bodyPr wrap="none" rtlCol="0">
+            <a:spAutoFit/>
+          </a:bodyPr>
+          <a:lstStyle/>
+          <a:p>
+            <a:pPr algn="ctr"/>
+            <a:r>
+              <a:rPr lang="en-US" b="1" dirty="0" err="1" smtClean="0">
+                <a:solidFill>
+                  <a:schemeClr val="bg2">
+                    <a:lumMod val="25000"/>
+                  </a:schemeClr>
+                </a:solidFill>
+                <a:latin typeface="+mn-lt"/>
+              </a:rPr>
+              <a:t>CloudBees</a:t>
+            </a:r>
+            <a:r>
+              <a:rPr lang="en-US" b="1" dirty="0" smtClean="0">
+                <a:solidFill>
+                  <a:schemeClr val="bg2">
+                    <a:lumMod val="25000"/>
+                  </a:schemeClr>
+                </a:solidFill>
+                <a:latin typeface="+mn-lt"/>
+              </a:rPr>
+              <a:t> SDK</a:t>
+            </a:r>
+            <a:endParaRPr lang="en-US" b="1" dirty="0">
+              <a:solidFill>
+                <a:schemeClr val="bg2">
+                  <a:lumMod val="25000"/>
+                </a:schemeClr>
+              </a:solidFill>
+              <a:latin typeface="+mn-lt"/>
             </a:endParaRPr>
           </a:p>
         </p:txBody>

</xml_diff>